<commit_message>
Basic functions (Add, edit, delete) for settings are done.
</commit_message>
<xml_diff>
--- a/1x/toggles.pptx
+++ b/1x/toggles.pptx
@@ -7,6 +7,8 @@
   <p:sldIdLst>
     <p:sldId id="257" r:id="rId2"/>
     <p:sldId id="258" r:id="rId3"/>
+    <p:sldId id="259" r:id="rId4"/>
+    <p:sldId id="260" r:id="rId5"/>
   </p:sldIdLst>
   <p:sldSz cx="4500563" cy="2160588"/>
   <p:notesSz cx="6858000" cy="9144000"/>
@@ -105,6 +107,11 @@
       </a:defRPr>
     </a:lvl9pPr>
   </p:defaultTextStyle>
+  <p:extLst>
+    <p:ext uri="{EFAFB233-063F-42B5-8137-9DF3F51BA10A}">
+      <p15:sldGuideLst xmlns:p15="http://schemas.microsoft.com/office/powerpoint/2012/main"/>
+    </p:ext>
+  </p:extLst>
 </p:presentation>
 </file>
 
@@ -239,7 +246,7 @@
           <a:p>
             <a:fld id="{5BFD2C50-4819-476A-A7D5-07024E34A360}" type="datetimeFigureOut">
               <a:rPr lang="en-US" smtClean="0"/>
-              <a:t>22.02.25</a:t>
+              <a:t>08.03.25</a:t>
             </a:fld>
             <a:endParaRPr lang="en-US"/>
           </a:p>
@@ -409,7 +416,7 @@
           <a:p>
             <a:fld id="{5BFD2C50-4819-476A-A7D5-07024E34A360}" type="datetimeFigureOut">
               <a:rPr lang="en-US" smtClean="0"/>
-              <a:t>22.02.25</a:t>
+              <a:t>08.03.25</a:t>
             </a:fld>
             <a:endParaRPr lang="en-US"/>
           </a:p>
@@ -589,7 +596,7 @@
           <a:p>
             <a:fld id="{5BFD2C50-4819-476A-A7D5-07024E34A360}" type="datetimeFigureOut">
               <a:rPr lang="en-US" smtClean="0"/>
-              <a:t>22.02.25</a:t>
+              <a:t>08.03.25</a:t>
             </a:fld>
             <a:endParaRPr lang="en-US"/>
           </a:p>
@@ -759,7 +766,7 @@
           <a:p>
             <a:fld id="{5BFD2C50-4819-476A-A7D5-07024E34A360}" type="datetimeFigureOut">
               <a:rPr lang="en-US" smtClean="0"/>
-              <a:t>22.02.25</a:t>
+              <a:t>08.03.25</a:t>
             </a:fld>
             <a:endParaRPr lang="en-US"/>
           </a:p>
@@ -1005,7 +1012,7 @@
           <a:p>
             <a:fld id="{5BFD2C50-4819-476A-A7D5-07024E34A360}" type="datetimeFigureOut">
               <a:rPr lang="en-US" smtClean="0"/>
-              <a:t>22.02.25</a:t>
+              <a:t>08.03.25</a:t>
             </a:fld>
             <a:endParaRPr lang="en-US"/>
           </a:p>
@@ -1237,7 +1244,7 @@
           <a:p>
             <a:fld id="{5BFD2C50-4819-476A-A7D5-07024E34A360}" type="datetimeFigureOut">
               <a:rPr lang="en-US" smtClean="0"/>
-              <a:t>22.02.25</a:t>
+              <a:t>08.03.25</a:t>
             </a:fld>
             <a:endParaRPr lang="en-US"/>
           </a:p>
@@ -1604,7 +1611,7 @@
           <a:p>
             <a:fld id="{5BFD2C50-4819-476A-A7D5-07024E34A360}" type="datetimeFigureOut">
               <a:rPr lang="en-US" smtClean="0"/>
-              <a:t>22.02.25</a:t>
+              <a:t>08.03.25</a:t>
             </a:fld>
             <a:endParaRPr lang="en-US"/>
           </a:p>
@@ -1722,7 +1729,7 @@
           <a:p>
             <a:fld id="{5BFD2C50-4819-476A-A7D5-07024E34A360}" type="datetimeFigureOut">
               <a:rPr lang="en-US" smtClean="0"/>
-              <a:t>22.02.25</a:t>
+              <a:t>08.03.25</a:t>
             </a:fld>
             <a:endParaRPr lang="en-US"/>
           </a:p>
@@ -1817,7 +1824,7 @@
           <a:p>
             <a:fld id="{5BFD2C50-4819-476A-A7D5-07024E34A360}" type="datetimeFigureOut">
               <a:rPr lang="en-US" smtClean="0"/>
-              <a:t>22.02.25</a:t>
+              <a:t>08.03.25</a:t>
             </a:fld>
             <a:endParaRPr lang="en-US"/>
           </a:p>
@@ -2094,7 +2101,7 @@
           <a:p>
             <a:fld id="{5BFD2C50-4819-476A-A7D5-07024E34A360}" type="datetimeFigureOut">
               <a:rPr lang="en-US" smtClean="0"/>
-              <a:t>22.02.25</a:t>
+              <a:t>08.03.25</a:t>
             </a:fld>
             <a:endParaRPr lang="en-US"/>
           </a:p>
@@ -2351,7 +2358,7 @@
           <a:p>
             <a:fld id="{5BFD2C50-4819-476A-A7D5-07024E34A360}" type="datetimeFigureOut">
               <a:rPr lang="en-US" smtClean="0"/>
-              <a:t>22.02.25</a:t>
+              <a:t>08.03.25</a:t>
             </a:fld>
             <a:endParaRPr lang="en-US"/>
           </a:p>
@@ -2564,7 +2571,7 @@
           <a:p>
             <a:fld id="{5BFD2C50-4819-476A-A7D5-07024E34A360}" type="datetimeFigureOut">
               <a:rPr lang="en-US" smtClean="0"/>
-              <a:t>22.02.25</a:t>
+              <a:t>08.03.25</a:t>
             </a:fld>
             <a:endParaRPr lang="en-US"/>
           </a:p>
@@ -2977,10 +2984,10 @@
       </p:grpSpPr>
       <p:grpSp>
         <p:nvGrpSpPr>
-          <p:cNvPr id="2" name="Group 1">
+          <p:cNvPr id="3" name="Group 2">
             <a:extLst>
               <a:ext uri="{FF2B5EF4-FFF2-40B4-BE49-F238E27FC236}">
-                <a16:creationId xmlns:a16="http://schemas.microsoft.com/office/drawing/2014/main" id="{4761BC3E-D0F3-27F5-1EEE-AA062F845E01}"/>
+                <a16:creationId xmlns:a16="http://schemas.microsoft.com/office/drawing/2014/main" id="{E24BC295-8A25-9E0C-816E-6508CD265F8D}"/>
               </a:ext>
             </a:extLst>
           </p:cNvPr>
@@ -2991,8 +2998,8 @@
           <a:xfrm>
             <a:off x="56384" y="42992"/>
             <a:ext cx="4444179" cy="2074605"/>
-            <a:chOff x="7472518" y="1414616"/>
-            <a:chExt cx="4444180" cy="2074606"/>
+            <a:chOff x="56384" y="42992"/>
+            <a:chExt cx="4444179" cy="2074605"/>
           </a:xfrm>
         </p:grpSpPr>
         <p:sp>
@@ -3009,8 +3016,8 @@
           </p:nvSpPr>
           <p:spPr>
             <a:xfrm>
-              <a:off x="7472518" y="1474839"/>
-              <a:ext cx="4444180" cy="1954161"/>
+              <a:off x="56384" y="103215"/>
+              <a:ext cx="4444179" cy="1954160"/>
             </a:xfrm>
             <a:prstGeom prst="roundRect">
               <a:avLst>
@@ -3073,8 +3080,8 @@
           </p:nvSpPr>
           <p:spPr>
             <a:xfrm>
-              <a:off x="7703577" y="1687765"/>
-              <a:ext cx="3982063" cy="1528309"/>
+              <a:off x="287443" y="316141"/>
+              <a:ext cx="3982062" cy="1528308"/>
             </a:xfrm>
             <a:prstGeom prst="roundRect">
               <a:avLst>
@@ -3118,7 +3125,7 @@
             <a:p>
               <a:pPr algn="r"/>
               <a:r>
-                <a:rPr lang="en-US" sz="13780" dirty="0">
+                <a:rPr lang="en-US" sz="13780" b="1" dirty="0">
                   <a:solidFill>
                     <a:schemeClr val="bg2">
                       <a:lumMod val="75000"/>
@@ -3128,7 +3135,7 @@
                 </a:rPr>
                 <a:t>O</a:t>
               </a:r>
-              <a:endParaRPr lang="en-US" sz="7172" dirty="0">
+              <a:endParaRPr lang="en-US" sz="7172" b="1" dirty="0">
                 <a:solidFill>
                   <a:schemeClr val="bg2">
                     <a:lumMod val="75000"/>
@@ -3153,8 +3160,8 @@
           </p:nvSpPr>
           <p:spPr>
             <a:xfrm>
-              <a:off x="7472518" y="1414616"/>
-              <a:ext cx="2074606" cy="2074606"/>
+              <a:off x="56384" y="42992"/>
+              <a:ext cx="2074606" cy="2074605"/>
             </a:xfrm>
             <a:prstGeom prst="ellipse">
               <a:avLst/>
@@ -3180,7 +3187,8 @@
               <a:lightRig rig="threePt" dir="t"/>
             </a:scene3d>
             <a:sp3d>
-              <a:bevelT w="762000" h="190500" prst="artDeco"/>
+              <a:bevelT w="1270000" h="127000" prst="artDeco"/>
+              <a:bevelB w="762000" h="762000"/>
             </a:sp3d>
           </p:spPr>
           <p:style>
@@ -3259,10 +3267,10 @@
         </p:nvGrpSpPr>
         <p:grpSpPr>
           <a:xfrm>
-            <a:off x="-20955" y="42992"/>
-            <a:ext cx="4542472" cy="2074605"/>
+            <a:off x="48495" y="42992"/>
+            <a:ext cx="4444146" cy="2074605"/>
             <a:chOff x="2733369" y="1414616"/>
-            <a:chExt cx="4542506" cy="2074606"/>
+            <a:chExt cx="4444180" cy="2074606"/>
           </a:xfrm>
           <a:solidFill>
             <a:schemeClr val="bg1">
@@ -3393,7 +3401,7 @@
                 <a:t>  </a:t>
               </a:r>
               <a:r>
-                <a:rPr lang="en-US" sz="13780" dirty="0">
+                <a:rPr lang="en-US" sz="13780" b="1" dirty="0">
                   <a:solidFill>
                     <a:schemeClr val="tx1">
                       <a:lumMod val="75000"/>
@@ -3404,7 +3412,7 @@
                 </a:rPr>
                 <a:t>I</a:t>
               </a:r>
-              <a:endParaRPr lang="en-US" sz="7172" dirty="0">
+              <a:endParaRPr lang="en-US" sz="7172" b="1" dirty="0">
                 <a:solidFill>
                   <a:schemeClr val="tx1">
                     <a:lumMod val="75000"/>
@@ -3430,7 +3438,7 @@
           </p:nvSpPr>
           <p:spPr>
             <a:xfrm>
-              <a:off x="5201269" y="1414616"/>
+              <a:off x="5060597" y="1414616"/>
               <a:ext cx="2074606" cy="2074606"/>
             </a:xfrm>
             <a:prstGeom prst="ellipse">
@@ -3452,7 +3460,8 @@
               <a:lightRig rig="threePt" dir="t"/>
             </a:scene3d>
             <a:sp3d>
-              <a:bevelT w="762000" h="190500" prst="artDeco"/>
+              <a:bevelT w="1270000" h="127000" prst="artDeco"/>
+              <a:bevelB w="127000" h="127000"/>
             </a:sp3d>
           </p:spPr>
           <p:style>
@@ -3485,6 +3494,592 @@
     <p:extLst>
       <p:ext uri="{BB962C8B-B14F-4D97-AF65-F5344CB8AC3E}">
         <p14:creationId xmlns:p14="http://schemas.microsoft.com/office/powerpoint/2010/main" val="785278976"/>
+      </p:ext>
+    </p:extLst>
+  </p:cSld>
+  <p:clrMapOvr>
+    <a:masterClrMapping/>
+  </p:clrMapOvr>
+</p:sld>
+</file>
+
+<file path=ppt/slides/slide3.xml><?xml version="1.0" encoding="utf-8"?>
+<p:sld xmlns:a="http://schemas.openxmlformats.org/drawingml/2006/main" xmlns:r="http://schemas.openxmlformats.org/officeDocument/2006/relationships" xmlns:p="http://schemas.openxmlformats.org/presentationml/2006/main">
+  <p:cSld>
+    <p:spTree>
+      <p:nvGrpSpPr>
+        <p:cNvPr id="1" name="">
+          <a:extLst>
+            <a:ext uri="{FF2B5EF4-FFF2-40B4-BE49-F238E27FC236}">
+              <a16:creationId xmlns:a16="http://schemas.microsoft.com/office/drawing/2014/main" id="{A5E8CB01-ED17-279C-4C3E-5D9BBF914446}"/>
+            </a:ext>
+          </a:extLst>
+        </p:cNvPr>
+        <p:cNvGrpSpPr/>
+        <p:nvPr/>
+      </p:nvGrpSpPr>
+      <p:grpSpPr>
+        <a:xfrm>
+          <a:off x="0" y="0"/>
+          <a:ext cx="0" cy="0"/>
+          <a:chOff x="0" y="0"/>
+          <a:chExt cx="0" cy="0"/>
+        </a:xfrm>
+      </p:grpSpPr>
+      <p:sp>
+        <p:nvSpPr>
+          <p:cNvPr id="2" name="Cross 1">
+            <a:extLst>
+              <a:ext uri="{FF2B5EF4-FFF2-40B4-BE49-F238E27FC236}">
+                <a16:creationId xmlns:a16="http://schemas.microsoft.com/office/drawing/2014/main" id="{FB31BE81-AC00-3702-1E4D-B0B5310509A1}"/>
+              </a:ext>
+            </a:extLst>
+          </p:cNvPr>
+          <p:cNvSpPr/>
+          <p:nvPr/>
+        </p:nvSpPr>
+        <p:spPr>
+          <a:xfrm>
+            <a:off x="2458424" y="143484"/>
+            <a:ext cx="1873619" cy="1873619"/>
+          </a:xfrm>
+          <a:prstGeom prst="plus">
+            <a:avLst>
+              <a:gd name="adj" fmla="val 36524"/>
+            </a:avLst>
+          </a:prstGeom>
+          <a:solidFill>
+            <a:schemeClr val="tx1">
+              <a:lumMod val="50000"/>
+              <a:lumOff val="50000"/>
+            </a:schemeClr>
+          </a:solidFill>
+          <a:ln>
+            <a:solidFill>
+              <a:srgbClr val="C3C3C3"/>
+            </a:solidFill>
+          </a:ln>
+          <a:scene3d>
+            <a:camera prst="orthographicFront"/>
+            <a:lightRig rig="morning" dir="t"/>
+          </a:scene3d>
+          <a:sp3d>
+            <a:bevelT w="127000" h="190500" prst="hardEdge"/>
+            <a:bevelB w="127000" h="190500" prst="coolSlant"/>
+          </a:sp3d>
+        </p:spPr>
+        <p:style>
+          <a:lnRef idx="2">
+            <a:schemeClr val="accent1">
+              <a:shade val="15000"/>
+            </a:schemeClr>
+          </a:lnRef>
+          <a:fillRef idx="1">
+            <a:schemeClr val="accent1"/>
+          </a:fillRef>
+          <a:effectRef idx="0">
+            <a:schemeClr val="accent1"/>
+          </a:effectRef>
+          <a:fontRef idx="minor">
+            <a:schemeClr val="lt1"/>
+          </a:fontRef>
+        </p:style>
+        <p:txBody>
+          <a:bodyPr rtlCol="0" anchor="ctr"/>
+          <a:lstStyle/>
+          <a:p>
+            <a:pPr algn="ctr"/>
+            <a:endParaRPr lang="en-US"/>
+          </a:p>
+        </p:txBody>
+      </p:sp>
+      <p:sp>
+        <p:nvSpPr>
+          <p:cNvPr id="3" name="Rectangle 2">
+            <a:extLst>
+              <a:ext uri="{FF2B5EF4-FFF2-40B4-BE49-F238E27FC236}">
+                <a16:creationId xmlns:a16="http://schemas.microsoft.com/office/drawing/2014/main" id="{69E0C751-FE6E-2CAD-F8B6-CA75F4F1D65B}"/>
+              </a:ext>
+            </a:extLst>
+          </p:cNvPr>
+          <p:cNvSpPr/>
+          <p:nvPr/>
+        </p:nvSpPr>
+        <p:spPr>
+          <a:xfrm>
+            <a:off x="979540" y="1522580"/>
+            <a:ext cx="1873619" cy="494523"/>
+          </a:xfrm>
+          <a:prstGeom prst="rect">
+            <a:avLst/>
+          </a:prstGeom>
+          <a:solidFill>
+            <a:schemeClr val="tx1">
+              <a:lumMod val="50000"/>
+              <a:lumOff val="50000"/>
+            </a:schemeClr>
+          </a:solidFill>
+          <a:ln>
+            <a:solidFill>
+              <a:srgbClr val="C3C3C3"/>
+            </a:solidFill>
+          </a:ln>
+          <a:scene3d>
+            <a:camera prst="orthographicFront"/>
+            <a:lightRig rig="morning" dir="t"/>
+          </a:scene3d>
+          <a:sp3d>
+            <a:bevelT w="127000" h="190500" prst="hardEdge"/>
+            <a:bevelB w="127000" h="190500" prst="coolSlant"/>
+          </a:sp3d>
+        </p:spPr>
+        <p:style>
+          <a:lnRef idx="2">
+            <a:schemeClr val="accent1">
+              <a:shade val="15000"/>
+            </a:schemeClr>
+          </a:lnRef>
+          <a:fillRef idx="1">
+            <a:schemeClr val="accent1"/>
+          </a:fillRef>
+          <a:effectRef idx="0">
+            <a:schemeClr val="accent1"/>
+          </a:effectRef>
+          <a:fontRef idx="minor">
+            <a:schemeClr val="lt1"/>
+          </a:fontRef>
+        </p:style>
+        <p:txBody>
+          <a:bodyPr rtlCol="0" anchor="ctr"/>
+          <a:lstStyle/>
+          <a:p>
+            <a:pPr algn="ctr"/>
+            <a:endParaRPr lang="en-US"/>
+          </a:p>
+        </p:txBody>
+      </p:sp>
+      <p:sp>
+        <p:nvSpPr>
+          <p:cNvPr id="11" name="Freeform: Shape 10">
+            <a:extLst>
+              <a:ext uri="{FF2B5EF4-FFF2-40B4-BE49-F238E27FC236}">
+                <a16:creationId xmlns:a16="http://schemas.microsoft.com/office/drawing/2014/main" id="{B4F9A956-2BF1-630E-5ADF-DFD2B67B73B4}"/>
+              </a:ext>
+            </a:extLst>
+          </p:cNvPr>
+          <p:cNvSpPr/>
+          <p:nvPr/>
+        </p:nvSpPr>
+        <p:spPr>
+          <a:xfrm rot="5400000">
+            <a:off x="-262033" y="355693"/>
+            <a:ext cx="1871240" cy="1561125"/>
+          </a:xfrm>
+          <a:custGeom>
+            <a:avLst/>
+            <a:gdLst>
+              <a:gd name="connsiteX0" fmla="*/ 0 w 1659290"/>
+              <a:gd name="connsiteY0" fmla="*/ 1384301 h 1384301"/>
+              <a:gd name="connsiteX1" fmla="*/ 0 w 1659290"/>
+              <a:gd name="connsiteY1" fmla="*/ 0 h 1384301"/>
+              <a:gd name="connsiteX2" fmla="*/ 681730 w 1659290"/>
+              <a:gd name="connsiteY2" fmla="*/ 502504 h 1384301"/>
+              <a:gd name="connsiteX3" fmla="*/ 1659290 w 1659290"/>
+              <a:gd name="connsiteY3" fmla="*/ 502504 h 1384301"/>
+              <a:gd name="connsiteX4" fmla="*/ 1659290 w 1659290"/>
+              <a:gd name="connsiteY4" fmla="*/ 881796 h 1384301"/>
+              <a:gd name="connsiteX5" fmla="*/ 681731 w 1659290"/>
+              <a:gd name="connsiteY5" fmla="*/ 881796 h 1384301"/>
+            </a:gdLst>
+            <a:ahLst/>
+            <a:cxnLst>
+              <a:cxn ang="0">
+                <a:pos x="connsiteX0" y="connsiteY0"/>
+              </a:cxn>
+              <a:cxn ang="0">
+                <a:pos x="connsiteX1" y="connsiteY1"/>
+              </a:cxn>
+              <a:cxn ang="0">
+                <a:pos x="connsiteX2" y="connsiteY2"/>
+              </a:cxn>
+              <a:cxn ang="0">
+                <a:pos x="connsiteX3" y="connsiteY3"/>
+              </a:cxn>
+              <a:cxn ang="0">
+                <a:pos x="connsiteX4" y="connsiteY4"/>
+              </a:cxn>
+              <a:cxn ang="0">
+                <a:pos x="connsiteX5" y="connsiteY5"/>
+              </a:cxn>
+            </a:cxnLst>
+            <a:rect l="l" t="t" r="r" b="b"/>
+            <a:pathLst>
+              <a:path w="1659290" h="1384301">
+                <a:moveTo>
+                  <a:pt x="0" y="1384301"/>
+                </a:moveTo>
+                <a:lnTo>
+                  <a:pt x="0" y="0"/>
+                </a:lnTo>
+                <a:lnTo>
+                  <a:pt x="681730" y="502504"/>
+                </a:lnTo>
+                <a:lnTo>
+                  <a:pt x="1659290" y="502504"/>
+                </a:lnTo>
+                <a:lnTo>
+                  <a:pt x="1659290" y="881796"/>
+                </a:lnTo>
+                <a:lnTo>
+                  <a:pt x="681731" y="881796"/>
+                </a:lnTo>
+                <a:close/>
+              </a:path>
+            </a:pathLst>
+          </a:custGeom>
+          <a:solidFill>
+            <a:schemeClr val="tx1">
+              <a:lumMod val="50000"/>
+              <a:lumOff val="50000"/>
+            </a:schemeClr>
+          </a:solidFill>
+          <a:ln>
+            <a:solidFill>
+              <a:srgbClr val="C3C3C3"/>
+            </a:solidFill>
+          </a:ln>
+          <a:scene3d>
+            <a:camera prst="orthographicFront"/>
+            <a:lightRig rig="morning" dir="t"/>
+          </a:scene3d>
+          <a:sp3d>
+            <a:bevelT w="127000" h="190500" prst="hardEdge"/>
+            <a:bevelB w="127000" h="190500" prst="coolSlant"/>
+          </a:sp3d>
+        </p:spPr>
+        <p:style>
+          <a:lnRef idx="2">
+            <a:schemeClr val="accent1">
+              <a:shade val="15000"/>
+            </a:schemeClr>
+          </a:lnRef>
+          <a:fillRef idx="1">
+            <a:schemeClr val="accent1"/>
+          </a:fillRef>
+          <a:effectRef idx="0">
+            <a:schemeClr val="accent1"/>
+          </a:effectRef>
+          <a:fontRef idx="minor">
+            <a:schemeClr val="lt1"/>
+          </a:fontRef>
+        </p:style>
+        <p:txBody>
+          <a:bodyPr rtlCol="0" anchor="ctr"/>
+          <a:lstStyle/>
+          <a:p>
+            <a:pPr algn="ctr"/>
+            <a:endParaRPr lang="en-US" dirty="0"/>
+          </a:p>
+        </p:txBody>
+      </p:sp>
+      <p:sp>
+        <p:nvSpPr>
+          <p:cNvPr id="14" name="Freeform: Shape 13">
+            <a:extLst>
+              <a:ext uri="{FF2B5EF4-FFF2-40B4-BE49-F238E27FC236}">
+                <a16:creationId xmlns:a16="http://schemas.microsoft.com/office/drawing/2014/main" id="{FDA307EC-00DE-2CCB-E0FC-3CD45CA80083}"/>
+              </a:ext>
+            </a:extLst>
+          </p:cNvPr>
+          <p:cNvSpPr/>
+          <p:nvPr/>
+        </p:nvSpPr>
+        <p:spPr>
+          <a:xfrm>
+            <a:off x="979540" y="-61094"/>
+            <a:ext cx="1882844" cy="1684411"/>
+          </a:xfrm>
+          <a:custGeom>
+            <a:avLst/>
+            <a:gdLst>
+              <a:gd name="connsiteX0" fmla="*/ 1533164 w 1882844"/>
+              <a:gd name="connsiteY0" fmla="*/ 0 h 1684411"/>
+              <a:gd name="connsiteX1" fmla="*/ 1882844 w 1882844"/>
+              <a:gd name="connsiteY1" fmla="*/ 349680 h 1684411"/>
+              <a:gd name="connsiteX2" fmla="*/ 557995 w 1882844"/>
+              <a:gd name="connsiteY2" fmla="*/ 1674529 h 1684411"/>
+              <a:gd name="connsiteX3" fmla="*/ 526056 w 1882844"/>
+              <a:gd name="connsiteY3" fmla="*/ 1642590 h 1684411"/>
+              <a:gd name="connsiteX4" fmla="*/ 539750 w 1882844"/>
+              <a:gd name="connsiteY4" fmla="*/ 1684411 h 1684411"/>
+              <a:gd name="connsiteX5" fmla="*/ 0 w 1882844"/>
+              <a:gd name="connsiteY5" fmla="*/ 1684411 h 1684411"/>
+              <a:gd name="connsiteX6" fmla="*/ 245955 w 1882844"/>
+              <a:gd name="connsiteY6" fmla="*/ 1362489 h 1684411"/>
+              <a:gd name="connsiteX7" fmla="*/ 208315 w 1882844"/>
+              <a:gd name="connsiteY7" fmla="*/ 1324849 h 1684411"/>
+            </a:gdLst>
+            <a:ahLst/>
+            <a:cxnLst>
+              <a:cxn ang="0">
+                <a:pos x="connsiteX0" y="connsiteY0"/>
+              </a:cxn>
+              <a:cxn ang="0">
+                <a:pos x="connsiteX1" y="connsiteY1"/>
+              </a:cxn>
+              <a:cxn ang="0">
+                <a:pos x="connsiteX2" y="connsiteY2"/>
+              </a:cxn>
+              <a:cxn ang="0">
+                <a:pos x="connsiteX3" y="connsiteY3"/>
+              </a:cxn>
+              <a:cxn ang="0">
+                <a:pos x="connsiteX4" y="connsiteY4"/>
+              </a:cxn>
+              <a:cxn ang="0">
+                <a:pos x="connsiteX5" y="connsiteY5"/>
+              </a:cxn>
+              <a:cxn ang="0">
+                <a:pos x="connsiteX6" y="connsiteY6"/>
+              </a:cxn>
+              <a:cxn ang="0">
+                <a:pos x="connsiteX7" y="connsiteY7"/>
+              </a:cxn>
+            </a:cxnLst>
+            <a:rect l="l" t="t" r="r" b="b"/>
+            <a:pathLst>
+              <a:path w="1882844" h="1684411">
+                <a:moveTo>
+                  <a:pt x="1533164" y="0"/>
+                </a:moveTo>
+                <a:lnTo>
+                  <a:pt x="1882844" y="349680"/>
+                </a:lnTo>
+                <a:lnTo>
+                  <a:pt x="557995" y="1674529"/>
+                </a:lnTo>
+                <a:lnTo>
+                  <a:pt x="526056" y="1642590"/>
+                </a:lnTo>
+                <a:lnTo>
+                  <a:pt x="539750" y="1684411"/>
+                </a:lnTo>
+                <a:lnTo>
+                  <a:pt x="0" y="1684411"/>
+                </a:lnTo>
+                <a:lnTo>
+                  <a:pt x="245955" y="1362489"/>
+                </a:lnTo>
+                <a:lnTo>
+                  <a:pt x="208315" y="1324849"/>
+                </a:lnTo>
+                <a:close/>
+              </a:path>
+            </a:pathLst>
+          </a:custGeom>
+          <a:solidFill>
+            <a:schemeClr val="tx1">
+              <a:lumMod val="50000"/>
+              <a:lumOff val="50000"/>
+            </a:schemeClr>
+          </a:solidFill>
+          <a:ln>
+            <a:solidFill>
+              <a:srgbClr val="C3C3C3"/>
+            </a:solidFill>
+          </a:ln>
+          <a:scene3d>
+            <a:camera prst="orthographicFront"/>
+            <a:lightRig rig="morning" dir="t"/>
+          </a:scene3d>
+          <a:sp3d>
+            <a:bevelT w="127000" h="190500" prst="hardEdge"/>
+            <a:bevelB w="127000" h="190500" prst="coolSlant"/>
+          </a:sp3d>
+        </p:spPr>
+        <p:style>
+          <a:lnRef idx="2">
+            <a:schemeClr val="accent1">
+              <a:shade val="15000"/>
+            </a:schemeClr>
+          </a:lnRef>
+          <a:fillRef idx="1">
+            <a:schemeClr val="accent1"/>
+          </a:fillRef>
+          <a:effectRef idx="0">
+            <a:schemeClr val="accent1"/>
+          </a:effectRef>
+          <a:fontRef idx="minor">
+            <a:schemeClr val="lt1"/>
+          </a:fontRef>
+        </p:style>
+        <p:txBody>
+          <a:bodyPr rtlCol="0" anchor="ctr"/>
+          <a:lstStyle/>
+          <a:p>
+            <a:pPr algn="ctr"/>
+            <a:endParaRPr lang="en-US"/>
+          </a:p>
+        </p:txBody>
+      </p:sp>
+    </p:spTree>
+    <p:extLst>
+      <p:ext uri="{BB962C8B-B14F-4D97-AF65-F5344CB8AC3E}">
+        <p14:creationId xmlns:p14="http://schemas.microsoft.com/office/powerpoint/2010/main" val="4035190088"/>
+      </p:ext>
+    </p:extLst>
+  </p:cSld>
+  <p:clrMapOvr>
+    <a:masterClrMapping/>
+  </p:clrMapOvr>
+</p:sld>
+</file>
+
+<file path=ppt/slides/slide4.xml><?xml version="1.0" encoding="utf-8"?>
+<p:sld xmlns:a="http://schemas.openxmlformats.org/drawingml/2006/main" xmlns:r="http://schemas.openxmlformats.org/officeDocument/2006/relationships" xmlns:p="http://schemas.openxmlformats.org/presentationml/2006/main">
+  <p:cSld>
+    <p:spTree>
+      <p:nvGrpSpPr>
+        <p:cNvPr id="1" name="">
+          <a:extLst>
+            <a:ext uri="{FF2B5EF4-FFF2-40B4-BE49-F238E27FC236}">
+              <a16:creationId xmlns:a16="http://schemas.microsoft.com/office/drawing/2014/main" id="{EE806EF9-D0CB-C8A6-D03B-25DB0C7145D0}"/>
+            </a:ext>
+          </a:extLst>
+        </p:cNvPr>
+        <p:cNvGrpSpPr/>
+        <p:nvPr/>
+      </p:nvGrpSpPr>
+      <p:grpSpPr>
+        <a:xfrm>
+          <a:off x="0" y="0"/>
+          <a:ext cx="0" cy="0"/>
+          <a:chOff x="0" y="0"/>
+          <a:chExt cx="0" cy="0"/>
+        </a:xfrm>
+      </p:grpSpPr>
+      <p:sp>
+        <p:nvSpPr>
+          <p:cNvPr id="4" name="Half Frame 3">
+            <a:extLst>
+              <a:ext uri="{FF2B5EF4-FFF2-40B4-BE49-F238E27FC236}">
+                <a16:creationId xmlns:a16="http://schemas.microsoft.com/office/drawing/2014/main" id="{2B257230-44CB-955C-0A64-EAEDD72DD5B2}"/>
+              </a:ext>
+            </a:extLst>
+          </p:cNvPr>
+          <p:cNvSpPr/>
+          <p:nvPr/>
+        </p:nvSpPr>
+        <p:spPr>
+          <a:xfrm rot="2700000">
+            <a:off x="1550286" y="891582"/>
+            <a:ext cx="1092048" cy="1092048"/>
+          </a:xfrm>
+          <a:prstGeom prst="halfFrame">
+            <a:avLst/>
+          </a:prstGeom>
+          <a:solidFill>
+            <a:schemeClr val="bg2"/>
+          </a:solidFill>
+          <a:ln>
+            <a:noFill/>
+          </a:ln>
+          <a:effectLst>
+            <a:outerShdw blurRad="50800" dist="38100" dir="5400000" algn="t" rotWithShape="0">
+              <a:prstClr val="black">
+                <a:alpha val="40000"/>
+              </a:prstClr>
+            </a:outerShdw>
+          </a:effectLst>
+        </p:spPr>
+        <p:style>
+          <a:lnRef idx="2">
+            <a:schemeClr val="accent1">
+              <a:shade val="15000"/>
+            </a:schemeClr>
+          </a:lnRef>
+          <a:fillRef idx="1">
+            <a:schemeClr val="accent1"/>
+          </a:fillRef>
+          <a:effectRef idx="0">
+            <a:schemeClr val="accent1"/>
+          </a:effectRef>
+          <a:fontRef idx="minor">
+            <a:schemeClr val="lt1"/>
+          </a:fontRef>
+        </p:style>
+        <p:txBody>
+          <a:bodyPr rtlCol="0" anchor="ctr"/>
+          <a:lstStyle/>
+          <a:p>
+            <a:pPr algn="ctr"/>
+            <a:endParaRPr lang="en-US" sz="7172"/>
+          </a:p>
+        </p:txBody>
+      </p:sp>
+      <p:sp>
+        <p:nvSpPr>
+          <p:cNvPr id="5" name="Half Frame 4">
+            <a:extLst>
+              <a:ext uri="{FF2B5EF4-FFF2-40B4-BE49-F238E27FC236}">
+                <a16:creationId xmlns:a16="http://schemas.microsoft.com/office/drawing/2014/main" id="{17F22BD8-C909-0910-C4ED-FA57AB20E909}"/>
+              </a:ext>
+            </a:extLst>
+          </p:cNvPr>
+          <p:cNvSpPr/>
+          <p:nvPr/>
+        </p:nvSpPr>
+        <p:spPr>
+          <a:xfrm rot="13500000">
+            <a:off x="3002949" y="534270"/>
+            <a:ext cx="1092048" cy="1092048"/>
+          </a:xfrm>
+          <a:prstGeom prst="halfFrame">
+            <a:avLst/>
+          </a:prstGeom>
+          <a:solidFill>
+            <a:schemeClr val="bg2"/>
+          </a:solidFill>
+          <a:ln>
+            <a:noFill/>
+          </a:ln>
+          <a:effectLst>
+            <a:outerShdw blurRad="50800" dist="38100" dir="5400000" algn="t" rotWithShape="0">
+              <a:prstClr val="black">
+                <a:alpha val="40000"/>
+              </a:prstClr>
+            </a:outerShdw>
+          </a:effectLst>
+        </p:spPr>
+        <p:style>
+          <a:lnRef idx="2">
+            <a:schemeClr val="accent1">
+              <a:shade val="15000"/>
+            </a:schemeClr>
+          </a:lnRef>
+          <a:fillRef idx="1">
+            <a:schemeClr val="accent1"/>
+          </a:fillRef>
+          <a:effectRef idx="0">
+            <a:schemeClr val="accent1"/>
+          </a:effectRef>
+          <a:fontRef idx="minor">
+            <a:schemeClr val="lt1"/>
+          </a:fontRef>
+        </p:style>
+        <p:txBody>
+          <a:bodyPr rtlCol="0" anchor="ctr"/>
+          <a:lstStyle/>
+          <a:p>
+            <a:pPr algn="ctr"/>
+            <a:endParaRPr lang="en-US" sz="7172"/>
+          </a:p>
+        </p:txBody>
+      </p:sp>
+    </p:spTree>
+    <p:extLst>
+      <p:ext uri="{BB962C8B-B14F-4D97-AF65-F5344CB8AC3E}">
+        <p14:creationId xmlns:p14="http://schemas.microsoft.com/office/powerpoint/2010/main" val="1789865448"/>
       </p:ext>
     </p:extLst>
   </p:cSld>

</xml_diff>